<commit_message>
Seaward extension method considerations. Bathymetry consideration added.
</commit_message>
<xml_diff>
--- a/Tutorials-SeawardExtensions/SeawardExtension_MethodConsiderations.pptx
+++ b/Tutorials-SeawardExtensions/SeawardExtension_MethodConsiderations.pptx
@@ -18,6 +18,7 @@
     <p:sldId id="266" r:id="rId12"/>
     <p:sldId id="267" r:id="rId13"/>
     <p:sldId id="269" r:id="rId14"/>
+    <p:sldId id="270" r:id="rId15"/>
   </p:sldIdLst>
   <p:sldSz cx="12192000" cy="6858000"/>
   <p:notesSz cx="6858000" cy="9144000"/>
@@ -127,7 +128,7 @@
 <file path=ppt/revisionInfo.xml><?xml version="1.0" encoding="utf-8"?>
 <p1510:revInfo xmlns:a="http://schemas.openxmlformats.org/drawingml/2006/main" xmlns:r="http://schemas.openxmlformats.org/officeDocument/2006/relationships" xmlns:p1510="http://schemas.microsoft.com/office/powerpoint/2015/10/main">
   <p1510:revLst>
-    <p1510:client id="{E81016A9-4F36-46A1-BE5B-0A005B624330}" v="34" dt="2022-12-06T11:28:33.016"/>
+    <p1510:client id="{E81016A9-4F36-46A1-BE5B-0A005B624330}" v="35" dt="2022-12-07T09:49:21.082"/>
   </p1510:revLst>
 </p1510:revInfo>
 </file>
@@ -137,7 +138,7 @@
   <pc:docChgLst>
     <pc:chgData name="Jonathan Handley" userId="724808fd-c72e-428e-9185-2d8751e189a0" providerId="ADAL" clId="{E81016A9-4F36-46A1-BE5B-0A005B624330}"/>
     <pc:docChg chg="undo custSel addSld delSld modSld">
-      <pc:chgData name="Jonathan Handley" userId="724808fd-c72e-428e-9185-2d8751e189a0" providerId="ADAL" clId="{E81016A9-4F36-46A1-BE5B-0A005B624330}" dt="2022-12-06T11:32:50.722" v="7963" actId="47"/>
+      <pc:chgData name="Jonathan Handley" userId="724808fd-c72e-428e-9185-2d8751e189a0" providerId="ADAL" clId="{E81016A9-4F36-46A1-BE5B-0A005B624330}" dt="2022-12-07T09:50:41.365" v="8205" actId="478"/>
       <pc:docMkLst>
         <pc:docMk/>
       </pc:docMkLst>
@@ -1075,6 +1076,93 @@
           <ac:cxnSpMkLst>
             <pc:docMk/>
             <pc:sldMk cId="3463077029" sldId="269"/>
+            <ac:cxnSpMk id="27" creationId="{57BABBEB-5ED8-F845-3DD1-0B8C0D697E0E}"/>
+          </ac:cxnSpMkLst>
+        </pc:cxnChg>
+      </pc:sldChg>
+      <pc:sldChg chg="delSp modSp add mod">
+        <pc:chgData name="Jonathan Handley" userId="724808fd-c72e-428e-9185-2d8751e189a0" providerId="ADAL" clId="{E81016A9-4F36-46A1-BE5B-0A005B624330}" dt="2022-12-07T09:50:41.365" v="8205" actId="478"/>
+        <pc:sldMkLst>
+          <pc:docMk/>
+          <pc:sldMk cId="4246769098" sldId="270"/>
+        </pc:sldMkLst>
+        <pc:spChg chg="mod">
+          <ac:chgData name="Jonathan Handley" userId="724808fd-c72e-428e-9185-2d8751e189a0" providerId="ADAL" clId="{E81016A9-4F36-46A1-BE5B-0A005B624330}" dt="2022-12-07T09:50:37.631" v="8204" actId="20577"/>
+          <ac:spMkLst>
+            <pc:docMk/>
+            <pc:sldMk cId="4246769098" sldId="270"/>
+            <ac:spMk id="3" creationId="{FC6ACD88-1046-15B6-54A4-D640D9C05AFE}"/>
+          </ac:spMkLst>
+        </pc:spChg>
+        <pc:spChg chg="del">
+          <ac:chgData name="Jonathan Handley" userId="724808fd-c72e-428e-9185-2d8751e189a0" providerId="ADAL" clId="{E81016A9-4F36-46A1-BE5B-0A005B624330}" dt="2022-12-07T09:50:41.365" v="8205" actId="478"/>
+          <ac:spMkLst>
+            <pc:docMk/>
+            <pc:sldMk cId="4246769098" sldId="270"/>
+            <ac:spMk id="17" creationId="{0D2FE5C4-4600-0E8B-8B3E-2E8E9D63744B}"/>
+          </ac:spMkLst>
+        </pc:spChg>
+        <pc:spChg chg="del">
+          <ac:chgData name="Jonathan Handley" userId="724808fd-c72e-428e-9185-2d8751e189a0" providerId="ADAL" clId="{E81016A9-4F36-46A1-BE5B-0A005B624330}" dt="2022-12-07T09:50:41.365" v="8205" actId="478"/>
+          <ac:spMkLst>
+            <pc:docMk/>
+            <pc:sldMk cId="4246769098" sldId="270"/>
+            <ac:spMk id="19" creationId="{4F593354-5242-7945-C5ED-DF3F6ADD6F2E}"/>
+          </ac:spMkLst>
+        </pc:spChg>
+        <pc:spChg chg="del">
+          <ac:chgData name="Jonathan Handley" userId="724808fd-c72e-428e-9185-2d8751e189a0" providerId="ADAL" clId="{E81016A9-4F36-46A1-BE5B-0A005B624330}" dt="2022-12-07T09:50:41.365" v="8205" actId="478"/>
+          <ac:spMkLst>
+            <pc:docMk/>
+            <pc:sldMk cId="4246769098" sldId="270"/>
+            <ac:spMk id="25" creationId="{6BED1001-6B8C-BA9C-1F40-A3A3846B9D9A}"/>
+          </ac:spMkLst>
+        </pc:spChg>
+        <pc:spChg chg="del">
+          <ac:chgData name="Jonathan Handley" userId="724808fd-c72e-428e-9185-2d8751e189a0" providerId="ADAL" clId="{E81016A9-4F36-46A1-BE5B-0A005B624330}" dt="2022-12-07T09:50:41.365" v="8205" actId="478"/>
+          <ac:spMkLst>
+            <pc:docMk/>
+            <pc:sldMk cId="4246769098" sldId="270"/>
+            <ac:spMk id="46" creationId="{37B28F3D-4ADD-6747-E289-8E7DCEC290E9}"/>
+          </ac:spMkLst>
+        </pc:spChg>
+        <pc:spChg chg="del">
+          <ac:chgData name="Jonathan Handley" userId="724808fd-c72e-428e-9185-2d8751e189a0" providerId="ADAL" clId="{E81016A9-4F36-46A1-BE5B-0A005B624330}" dt="2022-12-07T09:50:41.365" v="8205" actId="478"/>
+          <ac:spMkLst>
+            <pc:docMk/>
+            <pc:sldMk cId="4246769098" sldId="270"/>
+            <ac:spMk id="47" creationId="{368BB5A0-1991-C759-E9CE-6C601288FA50}"/>
+          </ac:spMkLst>
+        </pc:spChg>
+        <pc:picChg chg="del">
+          <ac:chgData name="Jonathan Handley" userId="724808fd-c72e-428e-9185-2d8751e189a0" providerId="ADAL" clId="{E81016A9-4F36-46A1-BE5B-0A005B624330}" dt="2022-12-07T09:50:41.365" v="8205" actId="478"/>
+          <ac:picMkLst>
+            <pc:docMk/>
+            <pc:sldMk cId="4246769098" sldId="270"/>
+            <ac:picMk id="15" creationId="{F9698976-26D3-E44F-C6AA-CAA8CB749F35}"/>
+          </ac:picMkLst>
+        </pc:picChg>
+        <pc:picChg chg="del">
+          <ac:chgData name="Jonathan Handley" userId="724808fd-c72e-428e-9185-2d8751e189a0" providerId="ADAL" clId="{E81016A9-4F36-46A1-BE5B-0A005B624330}" dt="2022-12-07T09:50:41.365" v="8205" actId="478"/>
+          <ac:picMkLst>
+            <pc:docMk/>
+            <pc:sldMk cId="4246769098" sldId="270"/>
+            <ac:picMk id="26" creationId="{B9706982-DA7B-2A3A-9CCE-7B92BE817CE8}"/>
+          </ac:picMkLst>
+        </pc:picChg>
+        <pc:cxnChg chg="del mod">
+          <ac:chgData name="Jonathan Handley" userId="724808fd-c72e-428e-9185-2d8751e189a0" providerId="ADAL" clId="{E81016A9-4F36-46A1-BE5B-0A005B624330}" dt="2022-12-07T09:50:41.365" v="8205" actId="478"/>
+          <ac:cxnSpMkLst>
+            <pc:docMk/>
+            <pc:sldMk cId="4246769098" sldId="270"/>
+            <ac:cxnSpMk id="18" creationId="{E998A549-A474-CB14-FC5F-6A30F7B2D497}"/>
+          </ac:cxnSpMkLst>
+        </pc:cxnChg>
+        <pc:cxnChg chg="del mod">
+          <ac:chgData name="Jonathan Handley" userId="724808fd-c72e-428e-9185-2d8751e189a0" providerId="ADAL" clId="{E81016A9-4F36-46A1-BE5B-0A005B624330}" dt="2022-12-07T09:50:41.365" v="8205" actId="478"/>
+          <ac:cxnSpMkLst>
+            <pc:docMk/>
+            <pc:sldMk cId="4246769098" sldId="270"/>
             <ac:cxnSpMk id="27" creationId="{57BABBEB-5ED8-F845-3DD1-0B8C0D697E0E}"/>
           </ac:cxnSpMkLst>
         </pc:cxnChg>
@@ -1233,7 +1321,7 @@
           <a:p>
             <a:fld id="{6091CB1C-3CDF-4780-9A49-9ECDC6830B2F}" type="datetimeFigureOut">
               <a:rPr lang="en-GB" smtClean="0"/>
-              <a:t>06/12/2022</a:t>
+              <a:t>07/12/2022</a:t>
             </a:fld>
             <a:endParaRPr lang="en-GB"/>
           </a:p>
@@ -1433,7 +1521,7 @@
           <a:p>
             <a:fld id="{6091CB1C-3CDF-4780-9A49-9ECDC6830B2F}" type="datetimeFigureOut">
               <a:rPr lang="en-GB" smtClean="0"/>
-              <a:t>06/12/2022</a:t>
+              <a:t>07/12/2022</a:t>
             </a:fld>
             <a:endParaRPr lang="en-GB"/>
           </a:p>
@@ -1643,7 +1731,7 @@
           <a:p>
             <a:fld id="{6091CB1C-3CDF-4780-9A49-9ECDC6830B2F}" type="datetimeFigureOut">
               <a:rPr lang="en-GB" smtClean="0"/>
-              <a:t>06/12/2022</a:t>
+              <a:t>07/12/2022</a:t>
             </a:fld>
             <a:endParaRPr lang="en-GB"/>
           </a:p>
@@ -1843,7 +1931,7 @@
           <a:p>
             <a:fld id="{6091CB1C-3CDF-4780-9A49-9ECDC6830B2F}" type="datetimeFigureOut">
               <a:rPr lang="en-GB" smtClean="0"/>
-              <a:t>06/12/2022</a:t>
+              <a:t>07/12/2022</a:t>
             </a:fld>
             <a:endParaRPr lang="en-GB"/>
           </a:p>
@@ -2119,7 +2207,7 @@
           <a:p>
             <a:fld id="{6091CB1C-3CDF-4780-9A49-9ECDC6830B2F}" type="datetimeFigureOut">
               <a:rPr lang="en-GB" smtClean="0"/>
-              <a:t>06/12/2022</a:t>
+              <a:t>07/12/2022</a:t>
             </a:fld>
             <a:endParaRPr lang="en-GB"/>
           </a:p>
@@ -2387,7 +2475,7 @@
           <a:p>
             <a:fld id="{6091CB1C-3CDF-4780-9A49-9ECDC6830B2F}" type="datetimeFigureOut">
               <a:rPr lang="en-GB" smtClean="0"/>
-              <a:t>06/12/2022</a:t>
+              <a:t>07/12/2022</a:t>
             </a:fld>
             <a:endParaRPr lang="en-GB"/>
           </a:p>
@@ -2802,7 +2890,7 @@
           <a:p>
             <a:fld id="{6091CB1C-3CDF-4780-9A49-9ECDC6830B2F}" type="datetimeFigureOut">
               <a:rPr lang="en-GB" smtClean="0"/>
-              <a:t>06/12/2022</a:t>
+              <a:t>07/12/2022</a:t>
             </a:fld>
             <a:endParaRPr lang="en-GB"/>
           </a:p>
@@ -2944,7 +3032,7 @@
           <a:p>
             <a:fld id="{6091CB1C-3CDF-4780-9A49-9ECDC6830B2F}" type="datetimeFigureOut">
               <a:rPr lang="en-GB" smtClean="0"/>
-              <a:t>06/12/2022</a:t>
+              <a:t>07/12/2022</a:t>
             </a:fld>
             <a:endParaRPr lang="en-GB"/>
           </a:p>
@@ -3057,7 +3145,7 @@
           <a:p>
             <a:fld id="{6091CB1C-3CDF-4780-9A49-9ECDC6830B2F}" type="datetimeFigureOut">
               <a:rPr lang="en-GB" smtClean="0"/>
-              <a:t>06/12/2022</a:t>
+              <a:t>07/12/2022</a:t>
             </a:fld>
             <a:endParaRPr lang="en-GB"/>
           </a:p>
@@ -3370,7 +3458,7 @@
           <a:p>
             <a:fld id="{6091CB1C-3CDF-4780-9A49-9ECDC6830B2F}" type="datetimeFigureOut">
               <a:rPr lang="en-GB" smtClean="0"/>
-              <a:t>06/12/2022</a:t>
+              <a:t>07/12/2022</a:t>
             </a:fld>
             <a:endParaRPr lang="en-GB"/>
           </a:p>
@@ -3659,7 +3747,7 @@
           <a:p>
             <a:fld id="{6091CB1C-3CDF-4780-9A49-9ECDC6830B2F}" type="datetimeFigureOut">
               <a:rPr lang="en-GB" smtClean="0"/>
-              <a:t>06/12/2022</a:t>
+              <a:t>07/12/2022</a:t>
             </a:fld>
             <a:endParaRPr lang="en-GB"/>
           </a:p>
@@ -3902,7 +3990,7 @@
           <a:p>
             <a:fld id="{6091CB1C-3CDF-4780-9A49-9ECDC6830B2F}" type="datetimeFigureOut">
               <a:rPr lang="en-GB" smtClean="0"/>
-              <a:t>06/12/2022</a:t>
+              <a:t>07/12/2022</a:t>
             </a:fld>
             <a:endParaRPr lang="en-GB"/>
           </a:p>
@@ -6450,6 +6538,150 @@
 </p:sld>
 </file>
 
+<file path=ppt/slides/slide14.xml><?xml version="1.0" encoding="utf-8"?>
+<p:sld xmlns:a="http://schemas.openxmlformats.org/drawingml/2006/main" xmlns:r="http://schemas.openxmlformats.org/officeDocument/2006/relationships" xmlns:p="http://schemas.openxmlformats.org/presentationml/2006/main">
+  <p:cSld>
+    <p:spTree>
+      <p:nvGrpSpPr>
+        <p:cNvPr id="1" name=""/>
+        <p:cNvGrpSpPr/>
+        <p:nvPr/>
+      </p:nvGrpSpPr>
+      <p:grpSpPr>
+        <a:xfrm>
+          <a:off x="0" y="0"/>
+          <a:ext cx="0" cy="0"/>
+          <a:chOff x="0" y="0"/>
+          <a:chExt cx="0" cy="0"/>
+        </a:xfrm>
+      </p:grpSpPr>
+      <p:sp>
+        <p:nvSpPr>
+          <p:cNvPr id="2" name="Title 1">
+            <a:extLst>
+              <a:ext uri="{FF2B5EF4-FFF2-40B4-BE49-F238E27FC236}">
+                <a16:creationId xmlns:a16="http://schemas.microsoft.com/office/drawing/2014/main" id="{691DBBC2-787B-3931-9D7C-72C9F7E582AC}"/>
+              </a:ext>
+            </a:extLst>
+          </p:cNvPr>
+          <p:cNvSpPr>
+            <a:spLocks noGrp="1"/>
+          </p:cNvSpPr>
+          <p:nvPr>
+            <p:ph type="title"/>
+          </p:nvPr>
+        </p:nvSpPr>
+        <p:spPr/>
+        <p:txBody>
+          <a:bodyPr/>
+          <a:lstStyle/>
+          <a:p>
+            <a:r>
+              <a:rPr lang="en-GB" dirty="0"/>
+              <a:t>What Seaward extension approach will we take for the new Marine Toolkit.</a:t>
+            </a:r>
+          </a:p>
+        </p:txBody>
+      </p:sp>
+      <p:sp>
+        <p:nvSpPr>
+          <p:cNvPr id="3" name="Content Placeholder 2">
+            <a:extLst>
+              <a:ext uri="{FF2B5EF4-FFF2-40B4-BE49-F238E27FC236}">
+                <a16:creationId xmlns:a16="http://schemas.microsoft.com/office/drawing/2014/main" id="{FC6ACD88-1046-15B6-54A4-D640D9C05AFE}"/>
+              </a:ext>
+            </a:extLst>
+          </p:cNvPr>
+          <p:cNvSpPr>
+            <a:spLocks noGrp="1"/>
+          </p:cNvSpPr>
+          <p:nvPr>
+            <p:ph idx="1"/>
+          </p:nvPr>
+        </p:nvSpPr>
+        <p:spPr>
+          <a:xfrm>
+            <a:off x="838201" y="1825624"/>
+            <a:ext cx="7690164" cy="4766709"/>
+          </a:xfrm>
+        </p:spPr>
+        <p:txBody>
+          <a:bodyPr>
+            <a:normAutofit/>
+          </a:bodyPr>
+          <a:lstStyle/>
+          <a:p>
+            <a:r>
+              <a:rPr lang="en-GB" dirty="0"/>
+              <a:t>Output goal options:</a:t>
+            </a:r>
+          </a:p>
+          <a:p>
+            <a:pPr marL="457200" lvl="1" indent="0">
+              <a:buNone/>
+            </a:pPr>
+            <a:r>
+              <a:rPr lang="en-GB" b="1" dirty="0">
+                <a:solidFill>
+                  <a:srgbClr val="0070C0"/>
+                </a:solidFill>
+              </a:rPr>
+              <a:t>Other improvement considerations</a:t>
+            </a:r>
+          </a:p>
+          <a:p>
+            <a:pPr lvl="2"/>
+            <a:r>
+              <a:rPr lang="en-GB" sz="1600" dirty="0"/>
+              <a:t>Bathymetry mask </a:t>
+            </a:r>
+          </a:p>
+          <a:p>
+            <a:pPr lvl="3"/>
+            <a:r>
+              <a:rPr lang="en-GB" sz="1400" dirty="0"/>
+              <a:t>Can we support an option to clip sites by bathymetry when evidence suggests appropriate?</a:t>
+            </a:r>
+          </a:p>
+          <a:p>
+            <a:pPr lvl="3"/>
+            <a:r>
+              <a:rPr lang="en-GB" sz="1400" dirty="0"/>
+              <a:t>Perhaps bring in data from ‘</a:t>
+            </a:r>
+            <a:r>
+              <a:rPr lang="en-GB" sz="1400" dirty="0" err="1"/>
+              <a:t>marmap</a:t>
+            </a:r>
+            <a:r>
+              <a:rPr lang="en-GB" sz="1400" dirty="0"/>
+              <a:t>’ R package, or allow users to use custom layers?</a:t>
+            </a:r>
+            <a:endParaRPr lang="en-GB" dirty="0"/>
+          </a:p>
+          <a:p>
+            <a:pPr lvl="2"/>
+            <a:endParaRPr lang="en-GB" sz="1600" dirty="0"/>
+          </a:p>
+          <a:p>
+            <a:pPr lvl="2"/>
+            <a:endParaRPr lang="en-GB" dirty="0"/>
+          </a:p>
+        </p:txBody>
+      </p:sp>
+    </p:spTree>
+    <p:extLst>
+      <p:ext uri="{BB962C8B-B14F-4D97-AF65-F5344CB8AC3E}">
+        <p14:creationId xmlns:p14="http://schemas.microsoft.com/office/powerpoint/2010/main" val="4246769098"/>
+      </p:ext>
+    </p:extLst>
+  </p:cSld>
+  <p:clrMapOvr>
+    <a:masterClrMapping/>
+  </p:clrMapOvr>
+</p:sld>
+</file>
+
 <file path=ppt/slides/slide2.xml><?xml version="1.0" encoding="utf-8"?>
 <p:sld xmlns:a="http://schemas.openxmlformats.org/drawingml/2006/main" xmlns:r="http://schemas.openxmlformats.org/officeDocument/2006/relationships" xmlns:p="http://schemas.openxmlformats.org/presentationml/2006/main">
   <p:cSld>

</xml_diff>